<commit_message>
minor changes to 2 slides
</commit_message>
<xml_diff>
--- a/PowerPoints/01 - Overview of Compilers.pptx
+++ b/PowerPoints/01 - Overview of Compilers.pptx
@@ -7501,7 +7501,7 @@
             <a:pPr lvl="2"/>
             <a:r>
               <a:rPr lang="en-US" dirty="0"/>
-              <a:t>can also run batch files</a:t>
+              <a:t>can also run command files (a.k.a. batch files)</a:t>
             </a:r>
           </a:p>
           <a:p>
@@ -48314,8 +48314,20 @@
           </a:p>
           <a:p>
             <a:r>
+              <a:rPr lang="en-US"/>
+              <a:t>Testing/</a:t>
+            </a:r>
+            <a:r>
               <a:rPr lang="en-US" dirty="0"/>
-              <a:t>Testing/Re-engineering tools</a:t>
+              <a:t>r</a:t>
+            </a:r>
+            <a:r>
+              <a:rPr lang="en-US"/>
+              <a:t>everse-engineering </a:t>
+            </a:r>
+            <a:r>
+              <a:rPr lang="en-US" dirty="0"/>
+              <a:t>tools</a:t>
             </a:r>
           </a:p>
           <a:p>

</xml_diff>